<commit_message>
Corrigindo nome da variável global no modo iife
</commit_message>
<xml_diff>
--- a/docs/apresentacao/Integracao_com_a_Prescricao_Eletronica_do_CFM.pptx
+++ b/docs/apresentacao/Integracao_com_a_Prescricao_Eletronica_do_CFM.pptx
@@ -39,7 +39,7 @@
       <p:boldItalic r:id="rId25"/>
     </p:embeddedFont>
     <p:embeddedFont>
-      <p:font typeface="Montserrat" panose="020B0604020202020204" charset="0"/>
+      <p:font typeface="Montserrat" panose="00000500000000000000" pitchFamily="2" charset="0"/>
       <p:regular r:id="rId26"/>
       <p:bold r:id="rId27"/>
       <p:italic r:id="rId28"/>
@@ -4608,7 +4608,7 @@
               <a:buNone/>
             </a:pPr>
             <a:r>
-              <a:rPr lang="en" b="0" dirty="0" smtClean="0">
+              <a:rPr lang="en" b="0" dirty="0">
                 <a:latin typeface="Aquawax Pro UltraBold" panose="02000003020000020004" pitchFamily="50" charset="0"/>
               </a:rPr>
               <a:t>Integração com a Prescrição Eletrônica do CFM</a:t>
@@ -4652,13 +4652,6 @@
   <p:clrMapOvr>
     <a:masterClrMapping/>
   </p:clrMapOvr>
-  <p:timing>
-    <p:tnLst>
-      <p:par>
-        <p:cTn id="1" dur="indefinite" restart="never" nodeType="tmRoot"/>
-      </p:par>
-    </p:tnLst>
-  </p:timing>
 </p:sld>
 </file>
 
@@ -4754,7 +4747,7 @@
               <a:buNone/>
             </a:pPr>
             <a:r>
-              <a:rPr lang="pt-BR" sz="7200" b="0" dirty="0" smtClean="0">
+              <a:rPr lang="pt-BR" sz="7200" b="0" dirty="0">
                 <a:solidFill>
                   <a:schemeClr val="lt1"/>
                 </a:solidFill>
@@ -4806,7 +4799,7 @@
               <a:buNone/>
             </a:pPr>
             <a:r>
-              <a:rPr lang="en" sz="4000" dirty="0" smtClean="0">
+              <a:rPr lang="en" sz="4000" dirty="0">
                 <a:latin typeface="Aquawax Pro Bold" panose="02000003020000020004" pitchFamily="50" charset="0"/>
               </a:rPr>
               <a:t>Como funciona o seu sistema?</a:t>
@@ -4848,7 +4841,7 @@
               </a:spcBef>
             </a:pPr>
             <a:r>
-              <a:rPr lang="pt-BR" sz="2000" dirty="0" smtClean="0">
+              <a:rPr lang="pt-BR" sz="2000" dirty="0">
                 <a:latin typeface="Aquawax Pro Light" panose="02000003020000020004" pitchFamily="50" charset="0"/>
               </a:rPr>
               <a:t>Texto livre</a:t>
@@ -4861,19 +4854,19 @@
               </a:spcBef>
             </a:pPr>
             <a:r>
-              <a:rPr lang="pt-BR" sz="2000" dirty="0" smtClean="0">
+              <a:rPr lang="pt-BR" sz="2000" dirty="0">
                 <a:latin typeface="Aquawax Pro Light" panose="02000003020000020004" pitchFamily="50" charset="0"/>
               </a:rPr>
               <a:t>Ou Tratamentos </a:t>
             </a:r>
             <a:r>
-              <a:rPr lang="pt-BR" sz="2000" dirty="0" err="1" smtClean="0">
+              <a:rPr lang="pt-BR" sz="2000" dirty="0" err="1">
                 <a:latin typeface="Aquawax Pro Light" panose="02000003020000020004" pitchFamily="50" charset="0"/>
               </a:rPr>
               <a:t>pré</a:t>
             </a:r>
             <a:r>
-              <a:rPr lang="pt-BR" sz="2000" dirty="0" smtClean="0">
+              <a:rPr lang="pt-BR" sz="2000" dirty="0">
                 <a:latin typeface="Aquawax Pro Light" panose="02000003020000020004" pitchFamily="50" charset="0"/>
               </a:rPr>
               <a:t>-cadastrados</a:t>
@@ -5008,13 +5001,6 @@
   <p:clrMapOvr>
     <a:masterClrMapping/>
   </p:clrMapOvr>
-  <p:timing>
-    <p:tnLst>
-      <p:par>
-        <p:cTn id="1" dur="indefinite" restart="never" nodeType="tmRoot"/>
-      </p:par>
-    </p:tnLst>
-  </p:timing>
 </p:sld>
 </file>
 
@@ -5110,7 +5096,7 @@
               <a:buNone/>
             </a:pPr>
             <a:r>
-              <a:rPr lang="pt-BR" sz="7200" b="0" dirty="0" smtClean="0">
+              <a:rPr lang="pt-BR" sz="7200" b="0" dirty="0">
                 <a:solidFill>
                   <a:schemeClr val="lt1"/>
                 </a:solidFill>
@@ -5162,7 +5148,7 @@
               <a:buNone/>
             </a:pPr>
             <a:r>
-              <a:rPr lang="en" sz="4000" dirty="0" smtClean="0">
+              <a:rPr lang="en" sz="4000" dirty="0">
                 <a:latin typeface="Aquawax Pro Bold" panose="02000003020000020004" pitchFamily="50" charset="0"/>
               </a:rPr>
               <a:t>O que muda no sistema do CFM?</a:t>
@@ -5204,18 +5190,18 @@
               </a:spcBef>
             </a:pPr>
             <a:r>
-              <a:rPr lang="pt-BR" sz="2000" dirty="0" smtClean="0">
+              <a:rPr lang="pt-BR" sz="2000" dirty="0">
                 <a:latin typeface="Aquawax Pro Light" panose="02000003020000020004" pitchFamily="50" charset="0"/>
               </a:rPr>
               <a:t>Nova tela de </a:t>
             </a:r>
             <a:r>
-              <a:rPr lang="pt-BR" sz="2000" dirty="0" err="1" smtClean="0">
+              <a:rPr lang="pt-BR" sz="2000" dirty="0" err="1">
                 <a:latin typeface="Aquawax Pro Light" panose="02000003020000020004" pitchFamily="50" charset="0"/>
               </a:rPr>
               <a:t>login</a:t>
             </a:r>
-            <a:endParaRPr lang="pt-BR" sz="2000" dirty="0" smtClean="0">
+            <a:endParaRPr lang="pt-BR" sz="2000" dirty="0">
               <a:latin typeface="Aquawax Pro Light" panose="02000003020000020004" pitchFamily="50" charset="0"/>
             </a:endParaRPr>
           </a:p>
@@ -5226,7 +5212,7 @@
               </a:spcBef>
             </a:pPr>
             <a:r>
-              <a:rPr lang="pt-BR" sz="2000" dirty="0" smtClean="0">
+              <a:rPr lang="pt-BR" sz="2000" dirty="0">
                 <a:latin typeface="Aquawax Pro Light" panose="02000003020000020004" pitchFamily="50" charset="0"/>
               </a:rPr>
               <a:t>Nova tela de prescrição - parametrizável</a:t>
@@ -5361,13 +5347,6 @@
   <p:clrMapOvr>
     <a:masterClrMapping/>
   </p:clrMapOvr>
-  <p:timing>
-    <p:tnLst>
-      <p:par>
-        <p:cTn id="1" dur="indefinite" restart="never" nodeType="tmRoot"/>
-      </p:par>
-    </p:tnLst>
-  </p:timing>
 </p:sld>
 </file>
 
@@ -5423,7 +5402,7 @@
               <a:buNone/>
             </a:pPr>
             <a:r>
-              <a:rPr lang="pt-BR" sz="3000" b="1" dirty="0" smtClean="0">
+              <a:rPr lang="pt-BR" sz="3000" b="1" dirty="0">
                 <a:latin typeface="Aquawax Pro UltraBold" panose="02000003020000020004" pitchFamily="50" charset="0"/>
               </a:rPr>
               <a:t>Novo</a:t>
@@ -5440,12 +5419,12 @@
               <a:buNone/>
             </a:pPr>
             <a:r>
-              <a:rPr lang="pt-BR" sz="3000" b="1" dirty="0" err="1" smtClean="0">
+              <a:rPr lang="pt-BR" sz="3000" b="1" dirty="0" err="1">
                 <a:latin typeface="Aquawax Pro UltraBold" panose="02000003020000020004" pitchFamily="50" charset="0"/>
               </a:rPr>
               <a:t>login</a:t>
             </a:r>
-            <a:endParaRPr lang="pt-BR" sz="3000" b="1" dirty="0" smtClean="0">
+            <a:endParaRPr lang="pt-BR" sz="3000" b="1" dirty="0">
               <a:latin typeface="Aquawax Pro UltraBold" panose="02000003020000020004" pitchFamily="50" charset="0"/>
             </a:endParaRPr>
           </a:p>
@@ -5459,14 +5438,14 @@
               </a:spcAft>
               <a:buNone/>
             </a:pPr>
-            <a:endParaRPr lang="pt-BR" sz="3000" b="1" dirty="0" smtClean="0">
+            <a:endParaRPr lang="pt-BR" sz="3000" b="1" dirty="0">
               <a:latin typeface="Aquawax Pro UltraBold" panose="02000003020000020004" pitchFamily="50" charset="0"/>
             </a:endParaRPr>
           </a:p>
           <a:p>
             <a:pPr indent="-457200"/>
             <a:r>
-              <a:rPr lang="pt-BR" sz="3000" b="1" dirty="0" smtClean="0">
+              <a:rPr lang="pt-BR" sz="3000" b="1" dirty="0">
                 <a:latin typeface="Aquawax Pro UltraBold" panose="02000003020000020004" pitchFamily="50" charset="0"/>
               </a:rPr>
               <a:t>Embutido</a:t>
@@ -5475,7 +5454,7 @@
           <a:p>
             <a:pPr indent="-457200"/>
             <a:r>
-              <a:rPr lang="pt-BR" sz="3000" b="1" dirty="0" smtClean="0">
+              <a:rPr lang="pt-BR" sz="3000" b="1" dirty="0">
                 <a:latin typeface="Aquawax Pro UltraBold" panose="02000003020000020004" pitchFamily="50" charset="0"/>
               </a:rPr>
               <a:t>Mantém sessão</a:t>
@@ -6324,13 +6303,6 @@
   <p:clrMapOvr>
     <a:masterClrMapping/>
   </p:clrMapOvr>
-  <p:timing>
-    <p:tnLst>
-      <p:par>
-        <p:cTn id="1" dur="indefinite" restart="never" nodeType="tmRoot"/>
-      </p:par>
-    </p:tnLst>
-  </p:timing>
 </p:sld>
 </file>
 
@@ -6386,7 +6358,7 @@
               <a:buNone/>
             </a:pPr>
             <a:r>
-              <a:rPr lang="pt-BR" sz="3000" b="1" dirty="0" smtClean="0">
+              <a:rPr lang="pt-BR" sz="3000" b="1" dirty="0">
                 <a:latin typeface="Aquawax Pro UltraBold" panose="02000003020000020004" pitchFamily="50" charset="0"/>
               </a:rPr>
               <a:t>Nova prescrição</a:t>
@@ -6402,14 +6374,14 @@
               </a:spcAft>
               <a:buNone/>
             </a:pPr>
-            <a:endParaRPr lang="pt-BR" sz="3000" b="1" dirty="0" smtClean="0">
+            <a:endParaRPr lang="pt-BR" sz="3000" b="1" dirty="0">
               <a:latin typeface="Aquawax Pro UltraBold" panose="02000003020000020004" pitchFamily="50" charset="0"/>
             </a:endParaRPr>
           </a:p>
           <a:p>
             <a:pPr indent="-457200"/>
             <a:r>
-              <a:rPr lang="pt-BR" sz="3000" b="1" dirty="0" smtClean="0">
+              <a:rPr lang="pt-BR" sz="3000" b="1" dirty="0">
                 <a:latin typeface="Aquawax Pro UltraBold" panose="02000003020000020004" pitchFamily="50" charset="0"/>
               </a:rPr>
               <a:t>Embutida</a:t>
@@ -6418,7 +6390,7 @@
           <a:p>
             <a:pPr indent="-457200"/>
             <a:r>
-              <a:rPr lang="pt-BR" sz="3000" b="1" dirty="0" err="1" smtClean="0">
+              <a:rPr lang="pt-BR" sz="3000" b="1" dirty="0" err="1">
                 <a:latin typeface="Aquawax Pro UltraBold" panose="02000003020000020004" pitchFamily="50" charset="0"/>
               </a:rPr>
               <a:t>Parame-trizada</a:t>
@@ -7267,13 +7239,6 @@
   <p:clrMapOvr>
     <a:masterClrMapping/>
   </p:clrMapOvr>
-  <p:timing>
-    <p:tnLst>
-      <p:par>
-        <p:cTn id="1" dur="indefinite" restart="never" nodeType="tmRoot"/>
-      </p:par>
-    </p:tnLst>
-  </p:timing>
 </p:sld>
 </file>
 
@@ -7369,7 +7334,7 @@
               <a:buNone/>
             </a:pPr>
             <a:r>
-              <a:rPr lang="pt-BR" sz="7200" b="0" dirty="0" smtClean="0">
+              <a:rPr lang="pt-BR" sz="7200" b="0" dirty="0">
                 <a:solidFill>
                   <a:schemeClr val="lt1"/>
                 </a:solidFill>
@@ -7421,7 +7386,7 @@
               <a:buNone/>
             </a:pPr>
             <a:r>
-              <a:rPr lang="en" sz="4000" dirty="0" smtClean="0">
+              <a:rPr lang="en" sz="4000" dirty="0">
                 <a:latin typeface="Aquawax Pro Bold" panose="02000003020000020004" pitchFamily="50" charset="0"/>
               </a:rPr>
               <a:t>O que muda no seu sistema?</a:t>
@@ -7463,7 +7428,7 @@
               </a:spcBef>
             </a:pPr>
             <a:r>
-              <a:rPr lang="pt-BR" sz="2000" dirty="0" smtClean="0">
+              <a:rPr lang="pt-BR" sz="2000" dirty="0">
                 <a:latin typeface="Aquawax Pro Light" panose="02000003020000020004" pitchFamily="50" charset="0"/>
               </a:rPr>
               <a:t>Embutir componente do CFM</a:t>
@@ -7476,7 +7441,7 @@
               </a:spcBef>
             </a:pPr>
             <a:r>
-              <a:rPr lang="pt-BR" sz="2000" dirty="0" smtClean="0">
+              <a:rPr lang="pt-BR" sz="2000" dirty="0">
                 <a:latin typeface="Aquawax Pro Light" panose="02000003020000020004" pitchFamily="50" charset="0"/>
               </a:rPr>
               <a:t>Enviar dados da integração</a:t>
@@ -7489,7 +7454,7 @@
               </a:spcBef>
             </a:pPr>
             <a:r>
-              <a:rPr lang="pt-BR" sz="2000" dirty="0" smtClean="0">
+              <a:rPr lang="pt-BR" sz="2000" dirty="0">
                 <a:latin typeface="Aquawax Pro Light" panose="02000003020000020004" pitchFamily="50" charset="0"/>
               </a:rPr>
               <a:t>Receber PDF assinado</a:t>
@@ -7624,13 +7589,6 @@
   <p:clrMapOvr>
     <a:masterClrMapping/>
   </p:clrMapOvr>
-  <p:timing>
-    <p:tnLst>
-      <p:par>
-        <p:cTn id="1" dur="indefinite" restart="never" nodeType="tmRoot"/>
-      </p:par>
-    </p:tnLst>
-  </p:timing>
 </p:sld>
 </file>
 
@@ -7726,7 +7684,7 @@
               <a:buNone/>
             </a:pPr>
             <a:r>
-              <a:rPr lang="pt-BR" sz="7200" b="0" dirty="0" smtClean="0">
+              <a:rPr lang="pt-BR" sz="7200" b="0" dirty="0">
                 <a:solidFill>
                   <a:schemeClr val="lt1"/>
                 </a:solidFill>
@@ -7778,7 +7736,7 @@
               <a:buNone/>
             </a:pPr>
             <a:r>
-              <a:rPr lang="en" sz="4000" dirty="0" smtClean="0">
+              <a:rPr lang="en" sz="4000" dirty="0">
                 <a:latin typeface="Aquawax Pro Bold" panose="02000003020000020004" pitchFamily="50" charset="0"/>
               </a:rPr>
               <a:t>Quais dados devem ser enviados?</a:t>
@@ -7820,7 +7778,7 @@
               </a:spcBef>
             </a:pPr>
             <a:r>
-              <a:rPr lang="pt-BR" sz="2000" dirty="0" smtClean="0">
+              <a:rPr lang="pt-BR" sz="2000" dirty="0">
                 <a:latin typeface="Aquawax Pro Light" panose="02000003020000020004" pitchFamily="50" charset="0"/>
               </a:rPr>
               <a:t>Informações do seu sistema ou local de atendimento</a:t>
@@ -7833,7 +7791,7 @@
               </a:spcBef>
             </a:pPr>
             <a:r>
-              <a:rPr lang="pt-BR" sz="2000" dirty="0" smtClean="0">
+              <a:rPr lang="pt-BR" sz="2000" dirty="0">
                 <a:latin typeface="Aquawax Pro Light" panose="02000003020000020004" pitchFamily="50" charset="0"/>
               </a:rPr>
               <a:t>Dados do paciente</a:t>
@@ -7846,7 +7804,7 @@
               </a:spcBef>
             </a:pPr>
             <a:r>
-              <a:rPr lang="pt-BR" sz="2000" dirty="0" smtClean="0">
+              <a:rPr lang="pt-BR" sz="2000" dirty="0">
                 <a:latin typeface="Aquawax Pro Light" panose="02000003020000020004" pitchFamily="50" charset="0"/>
               </a:rPr>
               <a:t>Lista de medicamentos sendo prescritos</a:t>
@@ -7981,13 +7939,6 @@
   <p:clrMapOvr>
     <a:masterClrMapping/>
   </p:clrMapOvr>
-  <p:timing>
-    <p:tnLst>
-      <p:par>
-        <p:cTn id="1" dur="indefinite" restart="never" nodeType="tmRoot"/>
-      </p:par>
-    </p:tnLst>
-  </p:timing>
 </p:sld>
 </file>
 
@@ -8083,7 +8034,7 @@
               <a:buNone/>
             </a:pPr>
             <a:r>
-              <a:rPr lang="pt-BR" sz="7200" b="0" dirty="0" smtClean="0">
+              <a:rPr lang="pt-BR" sz="7200" b="0" dirty="0">
                 <a:solidFill>
                   <a:schemeClr val="lt1"/>
                 </a:solidFill>
@@ -8135,7 +8086,7 @@
               <a:buNone/>
             </a:pPr>
             <a:r>
-              <a:rPr lang="en" sz="4000" dirty="0" smtClean="0">
+              <a:rPr lang="en" sz="4000" dirty="0">
                 <a:latin typeface="Aquawax Pro Bold" panose="02000003020000020004" pitchFamily="50" charset="0"/>
               </a:rPr>
               <a:t>Qual a experiência do usuário final?</a:t>
@@ -8177,7 +8128,7 @@
               </a:spcBef>
             </a:pPr>
             <a:r>
-              <a:rPr lang="pt-BR" sz="2000" dirty="0" smtClean="0">
+              <a:rPr lang="pt-BR" sz="2000" dirty="0">
                 <a:latin typeface="Aquawax Pro Light" panose="02000003020000020004" pitchFamily="50" charset="0"/>
               </a:rPr>
               <a:t>Preencher informações no seu sistema</a:t>
@@ -8190,19 +8141,19 @@
               </a:spcBef>
             </a:pPr>
             <a:r>
-              <a:rPr lang="pt-BR" sz="2000" dirty="0" smtClean="0">
+              <a:rPr lang="pt-BR" sz="2000" dirty="0">
                 <a:latin typeface="Aquawax Pro Light" panose="02000003020000020004" pitchFamily="50" charset="0"/>
               </a:rPr>
               <a:t>Fazer </a:t>
             </a:r>
             <a:r>
-              <a:rPr lang="pt-BR" sz="2000" dirty="0" err="1" smtClean="0">
+              <a:rPr lang="pt-BR" sz="2000" dirty="0" err="1">
                 <a:latin typeface="Aquawax Pro Light" panose="02000003020000020004" pitchFamily="50" charset="0"/>
               </a:rPr>
               <a:t>login</a:t>
             </a:r>
             <a:r>
-              <a:rPr lang="pt-BR" sz="2000" dirty="0" smtClean="0">
+              <a:rPr lang="pt-BR" sz="2000" dirty="0">
                 <a:latin typeface="Aquawax Pro Light" panose="02000003020000020004" pitchFamily="50" charset="0"/>
               </a:rPr>
               <a:t> uma vez</a:t>
@@ -8215,7 +8166,7 @@
               </a:spcBef>
             </a:pPr>
             <a:r>
-              <a:rPr lang="pt-BR" sz="2000" dirty="0" smtClean="0">
+              <a:rPr lang="pt-BR" sz="2000" dirty="0">
                 <a:latin typeface="Aquawax Pro Light" panose="02000003020000020004" pitchFamily="50" charset="0"/>
               </a:rPr>
               <a:t>Realizar assinatura</a:t>
@@ -8347,13 +8298,6 @@
   <p:clrMapOvr>
     <a:masterClrMapping/>
   </p:clrMapOvr>
-  <p:timing>
-    <p:tnLst>
-      <p:par>
-        <p:cTn id="1" dur="indefinite" restart="never" nodeType="tmRoot"/>
-      </p:par>
-    </p:tnLst>
-  </p:timing>
 </p:sld>
 </file>
 
@@ -8409,19 +8353,53 @@
               <a:buNone/>
             </a:pPr>
             <a:r>
-              <a:rPr lang="pt-BR" sz="3000" b="1" dirty="0" smtClean="0">
+              <a:rPr lang="pt-BR" b="1" dirty="0">
                 <a:latin typeface="Aquawax Pro UltraBold" panose="02000003020000020004" pitchFamily="50" charset="0"/>
               </a:rPr>
-              <a:t>Exemplo: </a:t>
+              <a:t>Exemplo:</a:t>
+            </a:r>
+          </a:p>
+          <a:p>
+            <a:pPr marL="0" lvl="0" indent="0" algn="l" rtl="0">
+              <a:spcBef>
+                <a:spcPts val="600"/>
+              </a:spcBef>
+              <a:spcAft>
+                <a:spcPts val="0"/>
+              </a:spcAft>
+              <a:buNone/>
+            </a:pPr>
+            <a:r>
+              <a:rPr lang="pt-BR" sz="1400" dirty="0">
+                <a:solidFill>
+                  <a:srgbClr val="0070C0"/>
+                </a:solidFill>
+                <a:latin typeface="Aquawax Pro Light"/>
+                <a:hlinkClick r:id="rId3">
+                  <a:extLst>
+                    <a:ext uri="{A12FA001-AC4F-418D-AE19-62706E023703}">
+                      <ahyp:hlinkClr xmlns:ahyp="http://schemas.microsoft.com/office/drawing/2018/hyperlinkcolor" val="tx"/>
+                    </a:ext>
+                  </a:extLst>
+                </a:hlinkClick>
+              </a:rPr>
+              <a:t>https://conselho-federal-de-medicina.github.io/integracao-prescricao-cfm/exemplo/exemplo.html</a:t>
             </a:r>
             <a:r>
-              <a:rPr lang="en" sz="2000" dirty="0"/>
-              <a:t/>
+              <a:rPr lang="pt-BR" sz="1400" b="1" dirty="0">
+                <a:solidFill>
+                  <a:srgbClr val="0070C0"/>
+                </a:solidFill>
+                <a:latin typeface="Aquawax Pro Light"/>
+              </a:rPr>
+              <a:t> </a:t>
             </a:r>
-            <a:br>
-              <a:rPr lang="en" sz="2000" dirty="0"/>
-            </a:br>
-            <a:endParaRPr lang="en" sz="2000" dirty="0" smtClean="0"/>
+            <a:endParaRPr lang="en" sz="1400" dirty="0">
+              <a:solidFill>
+                <a:srgbClr val="0070C0"/>
+              </a:solidFill>
+              <a:latin typeface="Aquawax Pro Light"/>
+            </a:endParaRPr>
           </a:p>
         </p:txBody>
       </p:sp>
@@ -8818,7 +8796,7 @@
           <p:nvPr/>
         </p:nvPicPr>
         <p:blipFill>
-          <a:blip r:embed="rId3">
+          <a:blip r:embed="rId4">
             <a:alphaModFix/>
           </a:blip>
           <a:stretch>
@@ -8848,7 +8826,7 @@
           <p:nvPr/>
         </p:nvPicPr>
         <p:blipFill>
-          <a:blip r:embed="rId4"/>
+          <a:blip r:embed="rId5"/>
           <a:stretch>
             <a:fillRect/>
           </a:stretch>
@@ -8873,13 +8851,6 @@
   <p:clrMapOvr>
     <a:masterClrMapping/>
   </p:clrMapOvr>
-  <p:timing>
-    <p:tnLst>
-      <p:par>
-        <p:cTn id="1" dur="indefinite" restart="never" nodeType="tmRoot"/>
-      </p:par>
-    </p:tnLst>
-  </p:timing>
 </p:sld>
 </file>
 
@@ -8975,7 +8946,7 @@
               <a:buNone/>
             </a:pPr>
             <a:r>
-              <a:rPr lang="pt-BR" sz="7200" b="0" dirty="0" smtClean="0">
+              <a:rPr lang="pt-BR" sz="7200" b="0" dirty="0">
                 <a:solidFill>
                   <a:schemeClr val="lt1"/>
                 </a:solidFill>
@@ -9027,7 +8998,7 @@
               <a:buNone/>
             </a:pPr>
             <a:r>
-              <a:rPr lang="en" sz="3600" dirty="0" smtClean="0">
+              <a:rPr lang="en" sz="3600" dirty="0">
                 <a:latin typeface="Aquawax Pro Bold" panose="02000003020000020004" pitchFamily="50" charset="0"/>
               </a:rPr>
               <a:t>Quais os próximos passos para a integração?</a:t>
@@ -9069,31 +9040,36 @@
               </a:spcBef>
             </a:pPr>
             <a:r>
-              <a:rPr lang="pt-BR" sz="1600" dirty="0" smtClean="0">
+              <a:rPr lang="pt-BR" sz="1600" dirty="0">
                 <a:latin typeface="Aquawax Pro Light" panose="02000003020000020004" pitchFamily="50" charset="0"/>
               </a:rPr>
               <a:t>Acessar a documentação do desenvolvedor:</a:t>
             </a:r>
             <a:br>
-              <a:rPr lang="pt-BR" sz="1600" dirty="0" smtClean="0">
+              <a:rPr lang="pt-BR" sz="1600" dirty="0">
                 <a:latin typeface="Aquawax Pro Light" panose="02000003020000020004" pitchFamily="50" charset="0"/>
               </a:rPr>
             </a:br>
             <a:r>
               <a:rPr lang="pt-BR" sz="1400" dirty="0">
+                <a:solidFill>
+                  <a:srgbClr val="0070C0"/>
+                </a:solidFill>
                 <a:latin typeface="Aquawax Pro Light" panose="02000003020000020004" pitchFamily="50" charset="0"/>
-                <a:hlinkClick r:id="rId3"/>
+                <a:hlinkClick r:id="rId3">
+                  <a:extLst>
+                    <a:ext uri="{A12FA001-AC4F-418D-AE19-62706E023703}">
+                      <ahyp:hlinkClr xmlns:ahyp="http://schemas.microsoft.com/office/drawing/2018/hyperlinkcolor" val="tx"/>
+                    </a:ext>
+                  </a:extLst>
+                </a:hlinkClick>
               </a:rPr>
-              <a:t>https://</a:t>
+              <a:t>https://github.com/Conselho-Federal-de-Medicina/integracao-prescricao-cfm#readme</a:t>
             </a:r>
-            <a:r>
-              <a:rPr lang="pt-BR" sz="1400" dirty="0" smtClean="0">
-                <a:latin typeface="Aquawax Pro Light" panose="02000003020000020004" pitchFamily="50" charset="0"/>
-                <a:hlinkClick r:id="rId3"/>
-              </a:rPr>
-              <a:t>conselho-federal-de-medicina.github.io/integracao-prescricao-cfm</a:t>
-            </a:r>
-            <a:endParaRPr lang="pt-BR" sz="1400" dirty="0" smtClean="0">
+            <a:endParaRPr lang="pt-BR" sz="1400" dirty="0">
+              <a:solidFill>
+                <a:srgbClr val="0070C0"/>
+              </a:solidFill>
               <a:latin typeface="Aquawax Pro Light" panose="02000003020000020004" pitchFamily="50" charset="0"/>
             </a:endParaRPr>
           </a:p>
@@ -9104,22 +9080,10 @@
               </a:spcBef>
             </a:pPr>
             <a:r>
-              <a:rPr lang="pt-BR" sz="1600" dirty="0" smtClean="0">
+              <a:rPr lang="pt-BR" sz="1600" dirty="0">
                 <a:latin typeface="Aquawax Pro Light" panose="02000003020000020004" pitchFamily="50" charset="0"/>
               </a:rPr>
-              <a:t>Testar </a:t>
-            </a:r>
-            <a:r>
-              <a:rPr lang="pt-BR" sz="1600" dirty="0" smtClean="0">
-                <a:latin typeface="Aquawax Pro Light" panose="02000003020000020004" pitchFamily="50" charset="0"/>
-              </a:rPr>
-              <a:t>no ambiente de </a:t>
-            </a:r>
-            <a:r>
-              <a:rPr lang="pt-BR" sz="1600" dirty="0" smtClean="0">
-                <a:latin typeface="Aquawax Pro Light" panose="02000003020000020004" pitchFamily="50" charset="0"/>
-              </a:rPr>
-              <a:t>simulação</a:t>
+              <a:t>Testar no ambiente de simulação</a:t>
             </a:r>
           </a:p>
           <a:p>
@@ -9129,16 +9093,10 @@
               </a:spcBef>
             </a:pPr>
             <a:r>
-              <a:rPr lang="pt-BR" sz="1600" dirty="0" smtClean="0">
+              <a:rPr lang="pt-BR" sz="1600" dirty="0">
                 <a:latin typeface="Aquawax Pro Light" panose="02000003020000020004" pitchFamily="50" charset="0"/>
               </a:rPr>
-              <a:t>Cadastrar </a:t>
-            </a:r>
-            <a:r>
-              <a:rPr lang="pt-BR" sz="1600" dirty="0" smtClean="0">
-                <a:latin typeface="Aquawax Pro Light" panose="02000003020000020004" pitchFamily="50" charset="0"/>
-              </a:rPr>
-              <a:t>sua aplicação no CFM</a:t>
+              <a:t>Formalização do ACT – Acordo de Cooperação Técnica</a:t>
             </a:r>
           </a:p>
           <a:p>
@@ -9148,16 +9106,10 @@
               </a:spcBef>
             </a:pPr>
             <a:r>
-              <a:rPr lang="pt-BR" sz="1600" dirty="0" smtClean="0">
+              <a:rPr lang="pt-BR" sz="1600" dirty="0">
                 <a:latin typeface="Aquawax Pro Light" panose="02000003020000020004" pitchFamily="50" charset="0"/>
               </a:rPr>
-              <a:t>Testar no ambiente de </a:t>
-            </a:r>
-            <a:r>
-              <a:rPr lang="pt-BR" sz="1600" dirty="0" smtClean="0">
-                <a:latin typeface="Aquawax Pro Light" panose="02000003020000020004" pitchFamily="50" charset="0"/>
-              </a:rPr>
-              <a:t>homologação</a:t>
+              <a:t>Cadastrar sua aplicação no CFM</a:t>
             </a:r>
           </a:p>
           <a:p>
@@ -9167,14 +9119,11 @@
               </a:spcBef>
             </a:pPr>
             <a:r>
-              <a:rPr lang="pt-BR" sz="1600" dirty="0" smtClean="0">
+              <a:rPr lang="pt-BR" sz="1600" dirty="0">
                 <a:latin typeface="Aquawax Pro Light" panose="02000003020000020004" pitchFamily="50" charset="0"/>
               </a:rPr>
-              <a:t>Formalização do ACT – Acordo de Cooperação Técnica</a:t>
+              <a:t>Testar no ambiente de homologação</a:t>
             </a:r>
-            <a:endParaRPr lang="pt-BR" sz="1600" dirty="0" smtClean="0">
-              <a:latin typeface="Aquawax Pro Light" panose="02000003020000020004" pitchFamily="50" charset="0"/>
-            </a:endParaRPr>
           </a:p>
           <a:p>
             <a:pPr marL="342900" indent="-342900">
@@ -9183,7 +9132,7 @@
               </a:spcBef>
             </a:pPr>
             <a:r>
-              <a:rPr lang="pt-BR" sz="1600" dirty="0" smtClean="0">
+              <a:rPr lang="pt-BR" sz="1600" dirty="0">
                 <a:latin typeface="Aquawax Pro Light" panose="02000003020000020004" pitchFamily="50" charset="0"/>
               </a:rPr>
               <a:t>Publicar em produção</a:t>
@@ -9315,13 +9264,6 @@
   <p:clrMapOvr>
     <a:masterClrMapping/>
   </p:clrMapOvr>
-  <p:timing>
-    <p:tnLst>
-      <p:par>
-        <p:cTn id="1" dur="indefinite" restart="never" nodeType="tmRoot"/>
-      </p:par>
-    </p:tnLst>
-  </p:timing>
 </p:sld>
 </file>
 
@@ -9391,10 +9333,9 @@
           <a:lstStyle/>
           <a:p>
             <a:r>
-              <a:rPr lang="pt-BR" sz="2000" dirty="0" smtClean="0"/>
+              <a:rPr lang="pt-BR" sz="2000" dirty="0"/>
               <a:t>Obrigado!</a:t>
             </a:r>
-            <a:endParaRPr lang="pt-BR" sz="2000" dirty="0"/>
           </a:p>
         </p:txBody>
       </p:sp>
@@ -9408,13 +9349,6 @@
   <p:clrMapOvr>
     <a:masterClrMapping/>
   </p:clrMapOvr>
-  <p:timing>
-    <p:tnLst>
-      <p:par>
-        <p:cTn id="1" dur="indefinite" restart="never" nodeType="tmRoot"/>
-      </p:par>
-    </p:tnLst>
-  </p:timing>
 </p:sld>
 </file>
 
@@ -9510,7 +9444,7 @@
               <a:buNone/>
             </a:pPr>
             <a:r>
-              <a:rPr lang="en" sz="7200" b="0" dirty="0" smtClean="0">
+              <a:rPr lang="en" sz="7200" b="0" dirty="0">
                 <a:solidFill>
                   <a:schemeClr val="lt1"/>
                 </a:solidFill>
@@ -9562,7 +9496,7 @@
               <a:buNone/>
             </a:pPr>
             <a:r>
-              <a:rPr lang="en" sz="4000" dirty="0" smtClean="0">
+              <a:rPr lang="en" sz="4000" dirty="0">
                 <a:latin typeface="Aquawax Pro Bold" panose="02000003020000020004" pitchFamily="50" charset="0"/>
               </a:rPr>
               <a:t>Qual o objetivo desta apresentação?</a:t>
@@ -9604,16 +9538,10 @@
               </a:spcBef>
             </a:pPr>
             <a:r>
-              <a:rPr lang="pt-BR" sz="2000" dirty="0" smtClean="0">
+              <a:rPr lang="pt-BR" sz="2000" dirty="0">
                 <a:latin typeface="Aquawax Pro Light" panose="02000003020000020004" pitchFamily="50" charset="0"/>
               </a:rPr>
-              <a:t>Apresentar o modelo de integração </a:t>
-            </a:r>
-            <a:r>
-              <a:rPr lang="pt-BR" sz="2000" dirty="0" smtClean="0">
-                <a:latin typeface="Aquawax Pro Light" panose="02000003020000020004" pitchFamily="50" charset="0"/>
-              </a:rPr>
-              <a:t>com o sistema de Prescrição Eletrônica do Conselho Federal de Medicina (CFM)</a:t>
+              <a:t>Apresentar o modelo de integração com o sistema de Prescrição Eletrônica do Conselho Federal de Medicina (CFM)</a:t>
             </a:r>
             <a:endParaRPr sz="2000" dirty="0">
               <a:latin typeface="Aquawax Pro Light" panose="02000003020000020004" pitchFamily="50" charset="0"/>
@@ -9745,13 +9673,6 @@
   <p:clrMapOvr>
     <a:masterClrMapping/>
   </p:clrMapOvr>
-  <p:timing>
-    <p:tnLst>
-      <p:par>
-        <p:cTn id="1" dur="indefinite" restart="never" nodeType="tmRoot"/>
-      </p:par>
-    </p:tnLst>
-  </p:timing>
 </p:sld>
 </file>
 
@@ -9847,7 +9768,7 @@
               <a:buNone/>
             </a:pPr>
             <a:r>
-              <a:rPr lang="en" sz="7200" b="0" dirty="0" smtClean="0">
+              <a:rPr lang="en" sz="7200" b="0" dirty="0">
                 <a:solidFill>
                   <a:schemeClr val="lt1"/>
                 </a:solidFill>
@@ -9899,7 +9820,7 @@
               <a:buNone/>
             </a:pPr>
             <a:r>
-              <a:rPr lang="en" sz="4000" dirty="0" smtClean="0">
+              <a:rPr lang="en" sz="4000" dirty="0">
                 <a:latin typeface="Aquawax Pro Bold" panose="02000003020000020004" pitchFamily="50" charset="0"/>
               </a:rPr>
               <a:t>Para quem é esta apresentação?</a:t>
@@ -9941,7 +9862,7 @@
               </a:spcBef>
             </a:pPr>
             <a:r>
-              <a:rPr lang="pt-BR" sz="2000" dirty="0" smtClean="0">
+              <a:rPr lang="pt-BR" sz="2000" dirty="0">
                 <a:latin typeface="Aquawax Pro Light" panose="02000003020000020004" pitchFamily="50" charset="0"/>
               </a:rPr>
               <a:t>Esta apresentação é voltada a gerente e diretores, que precisam decidir se farão a integração e entender como isso afeta os seus sistemas.</a:t>
@@ -10076,13 +9997,6 @@
   <p:clrMapOvr>
     <a:masterClrMapping/>
   </p:clrMapOvr>
-  <p:timing>
-    <p:tnLst>
-      <p:par>
-        <p:cTn id="1" dur="indefinite" restart="never" nodeType="tmRoot"/>
-      </p:par>
-    </p:tnLst>
-  </p:timing>
 </p:sld>
 </file>
 
@@ -10178,7 +10092,7 @@
               <a:buNone/>
             </a:pPr>
             <a:r>
-              <a:rPr lang="pt-BR" sz="7200" b="0" dirty="0" smtClean="0">
+              <a:rPr lang="pt-BR" sz="7200" b="0" dirty="0">
                 <a:solidFill>
                   <a:schemeClr val="lt1"/>
                 </a:solidFill>
@@ -10230,34 +10144,10 @@
               <a:buNone/>
             </a:pPr>
             <a:r>
-              <a:rPr lang="en" sz="4000" dirty="0" smtClean="0">
-                <a:latin typeface="Aquawax Pro Bold" panose="02000003020000020004" pitchFamily="50" charset="0"/>
-              </a:rPr>
-              <a:t>Como funciona a Prescrição do </a:t>
-            </a:r>
-            <a:r>
-              <a:rPr lang="en" sz="4000" dirty="0" smtClean="0">
-                <a:latin typeface="Aquawax Pro Bold" panose="02000003020000020004" pitchFamily="50" charset="0"/>
-              </a:rPr>
-              <a:t>CFM</a:t>
-            </a:r>
-            <a:r>
               <a:rPr lang="en" sz="4000" dirty="0">
                 <a:latin typeface="Aquawax Pro Bold" panose="02000003020000020004" pitchFamily="50" charset="0"/>
               </a:rPr>
-              <a:t> </a:t>
-            </a:r>
-            <a:r>
-              <a:rPr lang="en" sz="4000" dirty="0" smtClean="0">
-                <a:latin typeface="Aquawax Pro Bold" panose="02000003020000020004" pitchFamily="50" charset="0"/>
-              </a:rPr>
-              <a:t>hoje</a:t>
-            </a:r>
-            <a:r>
-              <a:rPr lang="en" sz="4000" dirty="0" smtClean="0">
-                <a:latin typeface="Aquawax Pro Bold" panose="02000003020000020004" pitchFamily="50" charset="0"/>
-              </a:rPr>
-              <a:t>?</a:t>
+              <a:t>Como funciona a Prescrição do CFM?</a:t>
             </a:r>
             <a:endParaRPr sz="4000" dirty="0">
               <a:latin typeface="Aquawax Pro Bold" panose="02000003020000020004" pitchFamily="50" charset="0"/>
@@ -10296,12 +10186,12 @@
               </a:spcBef>
             </a:pPr>
             <a:r>
-              <a:rPr lang="pt-BR" sz="2000" dirty="0" err="1" smtClean="0">
+              <a:rPr lang="pt-BR" sz="2000" dirty="0" err="1">
                 <a:latin typeface="Aquawax Pro Light" panose="02000003020000020004" pitchFamily="50" charset="0"/>
               </a:rPr>
               <a:t>Login</a:t>
             </a:r>
-            <a:endParaRPr lang="pt-BR" sz="2000" dirty="0" smtClean="0">
+            <a:endParaRPr lang="pt-BR" sz="2000" dirty="0">
               <a:latin typeface="Aquawax Pro Light" panose="02000003020000020004" pitchFamily="50" charset="0"/>
             </a:endParaRPr>
           </a:p>
@@ -10312,7 +10202,7 @@
               </a:spcBef>
             </a:pPr>
             <a:r>
-              <a:rPr lang="pt-BR" sz="2000" dirty="0" smtClean="0">
+              <a:rPr lang="pt-BR" sz="2000" dirty="0">
                 <a:latin typeface="Aquawax Pro Light" panose="02000003020000020004" pitchFamily="50" charset="0"/>
               </a:rPr>
               <a:t>Sessão de assinatura</a:t>
@@ -10325,7 +10215,7 @@
               </a:spcBef>
             </a:pPr>
             <a:r>
-              <a:rPr lang="pt-BR" sz="2000" dirty="0" smtClean="0">
+              <a:rPr lang="pt-BR" sz="2000" dirty="0">
                 <a:latin typeface="Aquawax Pro Light" panose="02000003020000020004" pitchFamily="50" charset="0"/>
               </a:rPr>
               <a:t>Cadastro de locais de atendimento</a:t>
@@ -10338,7 +10228,7 @@
               </a:spcBef>
             </a:pPr>
             <a:r>
-              <a:rPr lang="pt-BR" sz="2000" dirty="0" smtClean="0">
+              <a:rPr lang="pt-BR" sz="2000" dirty="0">
                 <a:latin typeface="Aquawax Pro Light" panose="02000003020000020004" pitchFamily="50" charset="0"/>
               </a:rPr>
               <a:t>Cadastro de pacientes</a:t>
@@ -10351,7 +10241,7 @@
               </a:spcBef>
             </a:pPr>
             <a:r>
-              <a:rPr lang="pt-BR" sz="2000" dirty="0" smtClean="0">
+              <a:rPr lang="pt-BR" sz="2000" dirty="0">
                 <a:latin typeface="Aquawax Pro Light" panose="02000003020000020004" pitchFamily="50" charset="0"/>
               </a:rPr>
               <a:t>Emissão de documentos</a:t>
@@ -10486,13 +10376,6 @@
   <p:clrMapOvr>
     <a:masterClrMapping/>
   </p:clrMapOvr>
-  <p:timing>
-    <p:tnLst>
-      <p:par>
-        <p:cTn id="1" dur="indefinite" restart="never" nodeType="tmRoot"/>
-      </p:par>
-    </p:tnLst>
-  </p:timing>
 </p:sld>
 </file>
 
@@ -10548,31 +10431,15 @@
               <a:buNone/>
             </a:pPr>
             <a:r>
-              <a:rPr lang="pt-BR" sz="3000" b="1" dirty="0" smtClean="0">
+              <a:rPr lang="pt-BR" sz="3000" b="1" dirty="0">
                 <a:latin typeface="Aquawax Pro UltraBold" panose="02000003020000020004" pitchFamily="50" charset="0"/>
               </a:rPr>
-              <a:t>Página de </a:t>
-            </a:r>
-            <a:r>
-              <a:rPr lang="pt-BR" sz="3000" b="1" dirty="0" err="1" smtClean="0">
-                <a:latin typeface="Aquawax Pro UltraBold" panose="02000003020000020004" pitchFamily="50" charset="0"/>
-              </a:rPr>
-              <a:t>login</a:t>
-            </a:r>
-            <a:r>
-              <a:rPr lang="pt-BR" sz="3000" b="1" dirty="0" smtClean="0">
-                <a:latin typeface="Aquawax Pro UltraBold" panose="02000003020000020004" pitchFamily="50" charset="0"/>
-              </a:rPr>
-              <a:t> atual</a:t>
-            </a:r>
-            <a:r>
-              <a:rPr lang="en" sz="2000" dirty="0"/>
-              <a:t/>
+              <a:t>Página de login</a:t>
             </a:r>
             <a:br>
               <a:rPr lang="en" sz="2000" dirty="0"/>
             </a:br>
-            <a:endParaRPr lang="en" sz="2000" dirty="0" smtClean="0"/>
+            <a:endParaRPr lang="en" sz="2000" dirty="0"/>
           </a:p>
         </p:txBody>
       </p:sp>
@@ -11024,13 +10891,6 @@
   <p:clrMapOvr>
     <a:masterClrMapping/>
   </p:clrMapOvr>
-  <p:timing>
-    <p:tnLst>
-      <p:par>
-        <p:cTn id="1" dur="indefinite" restart="never" nodeType="tmRoot"/>
-      </p:par>
-    </p:tnLst>
-  </p:timing>
 </p:sld>
 </file>
 
@@ -11086,19 +10946,15 @@
               <a:buNone/>
             </a:pPr>
             <a:r>
-              <a:rPr lang="pt-BR" sz="3000" b="1" dirty="0" smtClean="0">
+              <a:rPr lang="pt-BR" sz="3000" b="1" dirty="0">
                 <a:latin typeface="Aquawax Pro UltraBold" panose="02000003020000020004" pitchFamily="50" charset="0"/>
               </a:rPr>
               <a:t>Ativando sessão de assinaturas</a:t>
             </a:r>
-            <a:r>
-              <a:rPr lang="en" sz="2000" dirty="0"/>
-              <a:t/>
-            </a:r>
             <a:br>
               <a:rPr lang="en" sz="2000" dirty="0"/>
             </a:br>
-            <a:endParaRPr lang="en" sz="2000" dirty="0" smtClean="0"/>
+            <a:endParaRPr lang="en" sz="2000" dirty="0"/>
           </a:p>
         </p:txBody>
       </p:sp>
@@ -11550,13 +11406,6 @@
   <p:clrMapOvr>
     <a:masterClrMapping/>
   </p:clrMapOvr>
-  <p:timing>
-    <p:tnLst>
-      <p:par>
-        <p:cTn id="1" dur="indefinite" restart="never" nodeType="tmRoot"/>
-      </p:par>
-    </p:tnLst>
-  </p:timing>
 </p:sld>
 </file>
 
@@ -11612,19 +11461,15 @@
               <a:buNone/>
             </a:pPr>
             <a:r>
-              <a:rPr lang="pt-BR" sz="3000" b="1" dirty="0" smtClean="0">
+              <a:rPr lang="pt-BR" sz="3000" b="1" dirty="0">
                 <a:latin typeface="Aquawax Pro UltraBold" panose="02000003020000020004" pitchFamily="50" charset="0"/>
               </a:rPr>
               <a:t>Cadastrando local de atendimento</a:t>
             </a:r>
-            <a:r>
-              <a:rPr lang="en" sz="2000" dirty="0"/>
-              <a:t/>
-            </a:r>
             <a:br>
               <a:rPr lang="en" sz="2000" dirty="0"/>
             </a:br>
-            <a:endParaRPr lang="en" sz="2000" dirty="0" smtClean="0"/>
+            <a:endParaRPr lang="en" sz="2000" dirty="0"/>
           </a:p>
         </p:txBody>
       </p:sp>
@@ -12076,13 +11921,6 @@
   <p:clrMapOvr>
     <a:masterClrMapping/>
   </p:clrMapOvr>
-  <p:timing>
-    <p:tnLst>
-      <p:par>
-        <p:cTn id="1" dur="indefinite" restart="never" nodeType="tmRoot"/>
-      </p:par>
-    </p:tnLst>
-  </p:timing>
 </p:sld>
 </file>
 
@@ -12138,19 +11976,15 @@
               <a:buNone/>
             </a:pPr>
             <a:r>
-              <a:rPr lang="pt-BR" sz="3000" b="1" dirty="0" smtClean="0">
+              <a:rPr lang="pt-BR" sz="3000" b="1" dirty="0">
                 <a:latin typeface="Aquawax Pro UltraBold" panose="02000003020000020004" pitchFamily="50" charset="0"/>
               </a:rPr>
               <a:t>Cadastrando paciente</a:t>
             </a:r>
-            <a:r>
-              <a:rPr lang="en" sz="2000" dirty="0" smtClean="0"/>
-              <a:t/>
-            </a:r>
             <a:br>
-              <a:rPr lang="en" sz="2000" dirty="0" smtClean="0"/>
+              <a:rPr lang="en" sz="2000" dirty="0"/>
             </a:br>
-            <a:endParaRPr lang="en" sz="2000" dirty="0" smtClean="0"/>
+            <a:endParaRPr lang="en" sz="2000" dirty="0"/>
           </a:p>
         </p:txBody>
       </p:sp>
@@ -12602,13 +12436,6 @@
   <p:clrMapOvr>
     <a:masterClrMapping/>
   </p:clrMapOvr>
-  <p:timing>
-    <p:tnLst>
-      <p:par>
-        <p:cTn id="1" dur="indefinite" restart="never" nodeType="tmRoot"/>
-      </p:par>
-    </p:tnLst>
-  </p:timing>
 </p:sld>
 </file>
 
@@ -12664,19 +12491,15 @@
               <a:buNone/>
             </a:pPr>
             <a:r>
-              <a:rPr lang="pt-BR" sz="3000" b="1" dirty="0" smtClean="0">
+              <a:rPr lang="pt-BR" sz="3000" b="1" dirty="0">
                 <a:latin typeface="Aquawax Pro UltraBold" panose="02000003020000020004" pitchFamily="50" charset="0"/>
               </a:rPr>
               <a:t>Emitindo receita</a:t>
             </a:r>
-            <a:r>
-              <a:rPr lang="en" sz="2000" dirty="0"/>
-              <a:t/>
-            </a:r>
             <a:br>
               <a:rPr lang="en" sz="2000" dirty="0"/>
             </a:br>
-            <a:endParaRPr lang="en" sz="2000" dirty="0" smtClean="0"/>
+            <a:endParaRPr lang="en" sz="2000" dirty="0"/>
           </a:p>
         </p:txBody>
       </p:sp>
@@ -13128,13 +12951,6 @@
   <p:clrMapOvr>
     <a:masterClrMapping/>
   </p:clrMapOvr>
-  <p:timing>
-    <p:tnLst>
-      <p:par>
-        <p:cTn id="1" dur="indefinite" restart="never" nodeType="tmRoot"/>
-      </p:par>
-    </p:tnLst>
-  </p:timing>
 </p:sld>
 </file>
 

</xml_diff>